<commit_message>
Sirius integration picture added
</commit_message>
<xml_diff>
--- a/Presentations/02/mdsd2.pptx
+++ b/Presentations/02/mdsd2.pptx
@@ -6000,25 +6000,35 @@
           <a:chExt cx="0" cy="0"/>
         </a:xfrm>
       </p:grpSpPr>
-      <p:sp>
-        <p:nvSpPr>
-          <p:cNvPr id="2" name="Tartalom helye 1"/>
-          <p:cNvSpPr>
-            <a:spLocks noGrp="1"/>
-          </p:cNvSpPr>
+      <p:pic>
+        <p:nvPicPr>
+          <p:cNvPr id="4" name="Tartalom helye 3"/>
+          <p:cNvPicPr>
+            <a:picLocks noGrp="1" noChangeAspect="1"/>
+          </p:cNvPicPr>
           <p:nvPr>
             <p:ph idx="1"/>
           </p:nvPr>
-        </p:nvSpPr>
-        <p:spPr/>
-        <p:txBody>
-          <a:bodyPr/>
-          <a:lstStyle/>
-          <a:p>
-            <a:endParaRPr lang="en-US" dirty="0"/>
-          </a:p>
-        </p:txBody>
-      </p:sp>
+        </p:nvPicPr>
+        <p:blipFill>
+          <a:blip r:embed="rId2">
+            <a:extLst>
+              <a:ext uri="{28A0092B-C50C-407E-A947-70E740481C1C}">
+                <a14:useLocalDpi xmlns:a14="http://schemas.microsoft.com/office/drawing/2010/main" val="0"/>
+              </a:ext>
+            </a:extLst>
+          </a:blip>
+          <a:stretch>
+            <a:fillRect/>
+          </a:stretch>
+        </p:blipFill>
+        <p:spPr>
+          <a:xfrm>
+            <a:off x="142875" y="1377075"/>
+            <a:ext cx="8858250" cy="4489613"/>
+          </a:xfrm>
+        </p:spPr>
+      </p:pic>
       <p:sp>
         <p:nvSpPr>
           <p:cNvPr id="3" name="Cím 2"/>

</xml_diff>

<commit_message>
New picture of running Sirius added
</commit_message>
<xml_diff>
--- a/Presentations/02/mdsd2.pptx
+++ b/Presentations/02/mdsd2.pptx
@@ -6,19 +6,20 @@
     <p:sldMasterId id="2147483655" r:id="rId2"/>
   </p:sldMasterIdLst>
   <p:notesMasterIdLst>
-    <p:notesMasterId r:id="rId10"/>
+    <p:notesMasterId r:id="rId11"/>
   </p:notesMasterIdLst>
   <p:handoutMasterIdLst>
-    <p:handoutMasterId r:id="rId11"/>
+    <p:handoutMasterId r:id="rId12"/>
   </p:handoutMasterIdLst>
   <p:sldIdLst>
     <p:sldId id="256" r:id="rId3"/>
     <p:sldId id="272" r:id="rId4"/>
     <p:sldId id="271" r:id="rId5"/>
-    <p:sldId id="273" r:id="rId6"/>
-    <p:sldId id="265" r:id="rId7"/>
-    <p:sldId id="269" r:id="rId8"/>
-    <p:sldId id="274" r:id="rId9"/>
+    <p:sldId id="275" r:id="rId6"/>
+    <p:sldId id="273" r:id="rId7"/>
+    <p:sldId id="265" r:id="rId8"/>
+    <p:sldId id="269" r:id="rId9"/>
+    <p:sldId id="274" r:id="rId10"/>
   </p:sldIdLst>
   <p:sldSz cx="9144000" cy="6858000" type="screen4x3"/>
   <p:notesSz cx="6858000" cy="9144000"/>
@@ -5803,6 +5804,88 @@
         </p:blipFill>
         <p:spPr>
           <a:xfrm>
+            <a:off x="142875" y="1327349"/>
+            <a:ext cx="8858250" cy="4589065"/>
+          </a:xfrm>
+        </p:spPr>
+      </p:pic>
+      <p:sp>
+        <p:nvSpPr>
+          <p:cNvPr id="3" name="Cím 2"/>
+          <p:cNvSpPr>
+            <a:spLocks noGrp="1"/>
+          </p:cNvSpPr>
+          <p:nvPr>
+            <p:ph type="title"/>
+          </p:nvPr>
+        </p:nvSpPr>
+        <p:spPr/>
+        <p:txBody>
+          <a:bodyPr/>
+          <a:lstStyle/>
+          <a:p>
+            <a:r>
+              <a:rPr lang="hu-HU" dirty="0" smtClean="0"/>
+              <a:t>Példánymodell – Struktúra 2</a:t>
+            </a:r>
+            <a:endParaRPr lang="en-US" dirty="0"/>
+          </a:p>
+        </p:txBody>
+      </p:sp>
+    </p:spTree>
+    <p:extLst>
+      <p:ext uri="{BB962C8B-B14F-4D97-AF65-F5344CB8AC3E}">
+        <p14:creationId xmlns:p14="http://schemas.microsoft.com/office/powerpoint/2010/main" val="3175199590"/>
+      </p:ext>
+    </p:extLst>
+  </p:cSld>
+  <p:clrMapOvr>
+    <a:masterClrMapping/>
+  </p:clrMapOvr>
+</p:sld>
+</file>
+
+<file path=ppt/slides/slide5.xml><?xml version="1.0" encoding="utf-8"?>
+<p:sld xmlns:a="http://schemas.openxmlformats.org/drawingml/2006/main" xmlns:r="http://schemas.openxmlformats.org/officeDocument/2006/relationships" xmlns:p="http://schemas.openxmlformats.org/presentationml/2006/main">
+  <p:cSld>
+    <p:spTree>
+      <p:nvGrpSpPr>
+        <p:cNvPr id="1" name=""/>
+        <p:cNvGrpSpPr/>
+        <p:nvPr/>
+      </p:nvGrpSpPr>
+      <p:grpSpPr>
+        <a:xfrm>
+          <a:off x="0" y="0"/>
+          <a:ext cx="0" cy="0"/>
+          <a:chOff x="0" y="0"/>
+          <a:chExt cx="0" cy="0"/>
+        </a:xfrm>
+      </p:grpSpPr>
+      <p:pic>
+        <p:nvPicPr>
+          <p:cNvPr id="4" name="Tartalom helye 3"/>
+          <p:cNvPicPr>
+            <a:picLocks noGrp="1" noChangeAspect="1"/>
+          </p:cNvPicPr>
+          <p:nvPr>
+            <p:ph idx="1"/>
+          </p:nvPr>
+        </p:nvPicPr>
+        <p:blipFill>
+          <a:blip r:embed="rId2">
+            <a:extLst>
+              <a:ext uri="{28A0092B-C50C-407E-A947-70E740481C1C}">
+                <a14:useLocalDpi xmlns:a14="http://schemas.microsoft.com/office/drawing/2010/main" val="0"/>
+              </a:ext>
+            </a:extLst>
+          </a:blip>
+          <a:stretch>
+            <a:fillRect/>
+          </a:stretch>
+        </p:blipFill>
+        <p:spPr>
+          <a:xfrm>
             <a:off x="1974830" y="857250"/>
             <a:ext cx="5194340" cy="5529263"/>
           </a:xfrm>
@@ -5848,7 +5931,7 @@
 </p:sld>
 </file>
 
-<file path=ppt/slides/slide5.xml><?xml version="1.0" encoding="utf-8"?>
+<file path=ppt/slides/slide6.xml><?xml version="1.0" encoding="utf-8"?>
 <p:sld xmlns:a="http://schemas.openxmlformats.org/drawingml/2006/main" xmlns:r="http://schemas.openxmlformats.org/officeDocument/2006/relationships" xmlns:p="http://schemas.openxmlformats.org/presentationml/2006/main">
   <p:cSld>
     <p:spTree>
@@ -5980,7 +6063,7 @@
 </p:sld>
 </file>
 
-<file path=ppt/slides/slide6.xml><?xml version="1.0" encoding="utf-8"?>
+<file path=ppt/slides/slide7.xml><?xml version="1.0" encoding="utf-8"?>
 <p:sld xmlns:a="http://schemas.openxmlformats.org/drawingml/2006/main" xmlns:r="http://schemas.openxmlformats.org/officeDocument/2006/relationships" xmlns:p="http://schemas.openxmlformats.org/presentationml/2006/main">
   <p:cSld>
     <p:spTree>
@@ -6104,7 +6187,7 @@
 </p:sld>
 </file>
 
-<file path=ppt/slides/slide7.xml><?xml version="1.0" encoding="utf-8"?>
+<file path=ppt/slides/slide8.xml><?xml version="1.0" encoding="utf-8"?>
 <p:sld xmlns:a="http://schemas.openxmlformats.org/drawingml/2006/main" xmlns:r="http://schemas.openxmlformats.org/officeDocument/2006/relationships" xmlns:p="http://schemas.openxmlformats.org/presentationml/2006/main">
   <p:cSld>
     <p:spTree>

</xml_diff>